<commit_message>
change conclusion a little bit
</commit_message>
<xml_diff>
--- a/統計應用軟體期末海報.pptx
+++ b/統計應用軟體期末海報.pptx
@@ -254,7 +254,7 @@
           <a:p>
             <a:fld id="{C580F354-F3CB-4C5C-A1BB-5F7DD257D8E1}" type="datetimeFigureOut">
               <a:rPr lang="zh-TW" altLang="en-US" smtClean="0"/>
-              <a:t>2025/4/23</a:t>
+              <a:t>2025/4/27</a:t>
             </a:fld>
             <a:endParaRPr lang="zh-TW" altLang="en-US"/>
           </a:p>
@@ -424,7 +424,7 @@
           <a:p>
             <a:fld id="{C580F354-F3CB-4C5C-A1BB-5F7DD257D8E1}" type="datetimeFigureOut">
               <a:rPr lang="zh-TW" altLang="en-US" smtClean="0"/>
-              <a:t>2025/4/23</a:t>
+              <a:t>2025/4/27</a:t>
             </a:fld>
             <a:endParaRPr lang="zh-TW" altLang="en-US"/>
           </a:p>
@@ -604,7 +604,7 @@
           <a:p>
             <a:fld id="{C580F354-F3CB-4C5C-A1BB-5F7DD257D8E1}" type="datetimeFigureOut">
               <a:rPr lang="zh-TW" altLang="en-US" smtClean="0"/>
-              <a:t>2025/4/23</a:t>
+              <a:t>2025/4/27</a:t>
             </a:fld>
             <a:endParaRPr lang="zh-TW" altLang="en-US"/>
           </a:p>
@@ -774,7 +774,7 @@
           <a:p>
             <a:fld id="{C580F354-F3CB-4C5C-A1BB-5F7DD257D8E1}" type="datetimeFigureOut">
               <a:rPr lang="zh-TW" altLang="en-US" smtClean="0"/>
-              <a:t>2025/4/23</a:t>
+              <a:t>2025/4/27</a:t>
             </a:fld>
             <a:endParaRPr lang="zh-TW" altLang="en-US"/>
           </a:p>
@@ -1025,7 +1025,7 @@
           <a:p>
             <a:fld id="{C580F354-F3CB-4C5C-A1BB-5F7DD257D8E1}" type="datetimeFigureOut">
               <a:rPr lang="zh-TW" altLang="en-US" smtClean="0"/>
-              <a:t>2025/4/23</a:t>
+              <a:t>2025/4/27</a:t>
             </a:fld>
             <a:endParaRPr lang="zh-TW" altLang="en-US"/>
           </a:p>
@@ -1257,7 +1257,7 @@
           <a:p>
             <a:fld id="{C580F354-F3CB-4C5C-A1BB-5F7DD257D8E1}" type="datetimeFigureOut">
               <a:rPr lang="zh-TW" altLang="en-US" smtClean="0"/>
-              <a:t>2025/4/23</a:t>
+              <a:t>2025/4/27</a:t>
             </a:fld>
             <a:endParaRPr lang="zh-TW" altLang="en-US"/>
           </a:p>
@@ -1604,7 +1604,7 @@
           <a:p>
             <a:fld id="{C580F354-F3CB-4C5C-A1BB-5F7DD257D8E1}" type="datetimeFigureOut">
               <a:rPr lang="zh-TW" altLang="en-US" smtClean="0"/>
-              <a:t>2025/4/23</a:t>
+              <a:t>2025/4/27</a:t>
             </a:fld>
             <a:endParaRPr lang="zh-TW" altLang="en-US"/>
           </a:p>
@@ -1722,7 +1722,7 @@
           <a:p>
             <a:fld id="{C580F354-F3CB-4C5C-A1BB-5F7DD257D8E1}" type="datetimeFigureOut">
               <a:rPr lang="zh-TW" altLang="en-US" smtClean="0"/>
-              <a:t>2025/4/23</a:t>
+              <a:t>2025/4/27</a:t>
             </a:fld>
             <a:endParaRPr lang="zh-TW" altLang="en-US"/>
           </a:p>
@@ -1840,7 +1840,7 @@
           <a:p>
             <a:fld id="{C580F354-F3CB-4C5C-A1BB-5F7DD257D8E1}" type="datetimeFigureOut">
               <a:rPr lang="zh-TW" altLang="en-US" smtClean="0"/>
-              <a:t>2025/4/23</a:t>
+              <a:t>2025/4/27</a:t>
             </a:fld>
             <a:endParaRPr lang="zh-TW" altLang="en-US"/>
           </a:p>
@@ -2124,7 +2124,7 @@
           <a:p>
             <a:fld id="{C580F354-F3CB-4C5C-A1BB-5F7DD257D8E1}" type="datetimeFigureOut">
               <a:rPr lang="zh-TW" altLang="en-US" smtClean="0"/>
-              <a:t>2025/4/23</a:t>
+              <a:t>2025/4/27</a:t>
             </a:fld>
             <a:endParaRPr lang="zh-TW" altLang="en-US"/>
           </a:p>
@@ -2388,7 +2388,7 @@
           <a:p>
             <a:fld id="{C580F354-F3CB-4C5C-A1BB-5F7DD257D8E1}" type="datetimeFigureOut">
               <a:rPr lang="zh-TW" altLang="en-US" smtClean="0"/>
-              <a:t>2025/4/23</a:t>
+              <a:t>2025/4/27</a:t>
             </a:fld>
             <a:endParaRPr lang="zh-TW" altLang="en-US"/>
           </a:p>
@@ -2602,7 +2602,7 @@
           <a:p>
             <a:fld id="{C580F354-F3CB-4C5C-A1BB-5F7DD257D8E1}" type="datetimeFigureOut">
               <a:rPr lang="zh-TW" altLang="en-US" smtClean="0"/>
-              <a:t>2025/4/23</a:t>
+              <a:t>2025/4/27</a:t>
             </a:fld>
             <a:endParaRPr lang="zh-TW" altLang="en-US"/>
           </a:p>
@@ -3640,8 +3640,8 @@
         </p:nvSpPr>
         <p:spPr>
           <a:xfrm>
-            <a:off x="15529518" y="38080233"/>
-            <a:ext cx="15369583" cy="2308324"/>
+            <a:off x="15504069" y="37808491"/>
+            <a:ext cx="15369583" cy="2862322"/>
           </a:xfrm>
           <a:prstGeom prst="rect">
             <a:avLst/>
@@ -3667,7 +3667,7 @@
                 <a:ea typeface="標楷體" panose="03000509000000000000" pitchFamily="65" charset="-120"/>
                 <a:cs typeface="Calibri" panose="020F0502020204030204" pitchFamily="34" charset="0"/>
               </a:rPr>
-              <a:t>根據迴歸分析結果，球員的薪資受到其年資與評分的顯著影響。標準化係數之後，顯示評分對薪資的影響力大於年資。然而，</a:t>
+              <a:t>根據迴歸分析，球員薪資受到經驗與評分的顯著影響，且評分對薪資的影響力大於年資。</a:t>
             </a:r>
             <a:r>
               <a:rPr lang="en-US" altLang="zh-TW" sz="3600" dirty="0">
@@ -3681,7 +3681,7 @@
                 <a:ea typeface="標楷體" panose="03000509000000000000" pitchFamily="65" charset="-120"/>
                 <a:cs typeface="Calibri" panose="020F0502020204030204" pitchFamily="34" charset="0"/>
               </a:rPr>
-              <a:t>分析顯示球隊對薪資並無顯著影響，球隊並非決定薪資的主要因素。整體結果說明，個人表現與經歷比所屬球隊更能解釋薪資差異。</a:t>
+              <a:t>分析顯示球隊對薪資並無顯著影響，球隊並非決定薪資的主要因素。結果表明，經驗與評分比所屬球隊更能解釋薪資差異。薪資整體分布呈現明顯的右偏性，是受到少數球員極高薪資的影響。球員的個人表現與經驗才是決定薪資差異的主要因素，而非球隊背景。</a:t>
             </a:r>
             <a:endParaRPr lang="zh-TW" altLang="zh-TW" sz="3600" dirty="0">
               <a:ea typeface="標楷體" panose="03000509000000000000" pitchFamily="65" charset="-120"/>
@@ -3964,7 +3964,7 @@
         </p:blipFill>
         <p:spPr>
           <a:xfrm>
-            <a:off x="907124" y="10668752"/>
+            <a:off x="907124" y="10511237"/>
             <a:ext cx="13800634" cy="10169856"/>
           </a:xfrm>
           <a:prstGeom prst="rect">
@@ -4038,13 +4038,13 @@
           <p:nvPr>
             <p:extLst>
               <p:ext uri="{D42A27DB-BD31-4B8C-83A1-F6EECF244321}">
-                <p14:modId xmlns:p14="http://schemas.microsoft.com/office/powerpoint/2010/main" val="3330116568"/>
+                <p14:modId xmlns:p14="http://schemas.microsoft.com/office/powerpoint/2010/main" val="2069743058"/>
               </p:ext>
             </p:extLst>
           </p:nvPr>
         </p:nvGraphicFramePr>
         <p:xfrm>
-          <a:off x="1363484" y="21220488"/>
+          <a:off x="1381667" y="20830300"/>
           <a:ext cx="13162464" cy="2588395"/>
         </p:xfrm>
         <a:graphic>
@@ -4498,13 +4498,13 @@
           <p:nvPr>
             <p:extLst>
               <p:ext uri="{D42A27DB-BD31-4B8C-83A1-F6EECF244321}">
-                <p14:modId xmlns:p14="http://schemas.microsoft.com/office/powerpoint/2010/main" val="1190048373"/>
+                <p14:modId xmlns:p14="http://schemas.microsoft.com/office/powerpoint/2010/main" val="3891121341"/>
               </p:ext>
             </p:extLst>
           </p:nvPr>
         </p:nvGraphicFramePr>
         <p:xfrm>
-          <a:off x="907122" y="36950124"/>
+          <a:off x="907122" y="36159800"/>
           <a:ext cx="13800636" cy="3740452"/>
         </p:xfrm>
         <a:graphic>
@@ -5183,7 +5183,7 @@
         </p:blipFill>
         <p:spPr>
           <a:xfrm>
-            <a:off x="907122" y="26406743"/>
+            <a:off x="907122" y="26091056"/>
             <a:ext cx="13567565" cy="10041399"/>
           </a:xfrm>
           <a:prstGeom prst="rect">
@@ -5465,6 +5465,94 @@
           </a:prstGeom>
         </p:spPr>
       </p:pic>
+      <p:sp>
+        <p:nvSpPr>
+          <p:cNvPr id="10" name="文字方塊 9">
+            <a:extLst>
+              <a:ext uri="{FF2B5EF4-FFF2-40B4-BE49-F238E27FC236}">
+                <a16:creationId xmlns:a16="http://schemas.microsoft.com/office/drawing/2014/main" id="{32B5B671-7779-2186-E1F6-BF03FCF3B270}"/>
+              </a:ext>
+            </a:extLst>
+          </p:cNvPr>
+          <p:cNvSpPr txBox="1"/>
+          <p:nvPr/>
+        </p:nvSpPr>
+        <p:spPr>
+          <a:xfrm>
+            <a:off x="1153317" y="23615737"/>
+            <a:ext cx="13619159" cy="646331"/>
+          </a:xfrm>
+          <a:prstGeom prst="rect">
+            <a:avLst/>
+          </a:prstGeom>
+          <a:noFill/>
+        </p:spPr>
+        <p:txBody>
+          <a:bodyPr wrap="square" rtlCol="0">
+            <a:spAutoFit/>
+          </a:bodyPr>
+          <a:lstStyle/>
+          <a:p>
+            <a:pPr algn="ctr"/>
+            <a:r>
+              <a:rPr lang="zh-TW" altLang="en-US" sz="3600" dirty="0">
+                <a:latin typeface="標楷體" panose="03000509000000000000" pitchFamily="65" charset="-120"/>
+                <a:ea typeface="標楷體" panose="03000509000000000000" pitchFamily="65" charset="-120"/>
+              </a:rPr>
+              <a:t>薪資分佈並非常態，呈現右偏，代表某些因素會顯著影響球員薪資。</a:t>
+            </a:r>
+            <a:endParaRPr lang="zh-TW" altLang="zh-TW" sz="3600" dirty="0">
+              <a:latin typeface="標楷體" panose="03000509000000000000" pitchFamily="65" charset="-120"/>
+              <a:ea typeface="標楷體" panose="03000509000000000000" pitchFamily="65" charset="-120"/>
+              <a:cs typeface="Calibri" panose="020F0502020204030204" pitchFamily="34" charset="0"/>
+            </a:endParaRPr>
+          </a:p>
+        </p:txBody>
+      </p:sp>
+      <p:sp>
+        <p:nvSpPr>
+          <p:cNvPr id="13" name="文字方塊 12">
+            <a:extLst>
+              <a:ext uri="{FF2B5EF4-FFF2-40B4-BE49-F238E27FC236}">
+                <a16:creationId xmlns:a16="http://schemas.microsoft.com/office/drawing/2014/main" id="{BB5B8BFE-3A59-DC54-90CB-107534903AEE}"/>
+              </a:ext>
+            </a:extLst>
+          </p:cNvPr>
+          <p:cNvSpPr txBox="1"/>
+          <p:nvPr/>
+        </p:nvSpPr>
+        <p:spPr>
+          <a:xfrm>
+            <a:off x="1347863" y="40025960"/>
+            <a:ext cx="13230069" cy="646331"/>
+          </a:xfrm>
+          <a:prstGeom prst="rect">
+            <a:avLst/>
+          </a:prstGeom>
+          <a:noFill/>
+        </p:spPr>
+        <p:txBody>
+          <a:bodyPr wrap="square" rtlCol="0">
+            <a:spAutoFit/>
+          </a:bodyPr>
+          <a:lstStyle/>
+          <a:p>
+            <a:pPr algn="ctr"/>
+            <a:r>
+              <a:rPr lang="zh-TW" altLang="en-US" sz="3600" dirty="0">
+                <a:latin typeface="標楷體" panose="03000509000000000000" pitchFamily="65" charset="-120"/>
+                <a:ea typeface="標楷體" panose="03000509000000000000" pitchFamily="65" charset="-120"/>
+              </a:rPr>
+              <a:t>根據變異數分析的結果，發現球隊對於薪資的影響並不顯著。 </a:t>
+            </a:r>
+            <a:endParaRPr lang="zh-TW" altLang="zh-TW" sz="3600" dirty="0">
+              <a:latin typeface="標楷體" panose="03000509000000000000" pitchFamily="65" charset="-120"/>
+              <a:ea typeface="標楷體" panose="03000509000000000000" pitchFamily="65" charset="-120"/>
+              <a:cs typeface="Calibri" panose="020F0502020204030204" pitchFamily="34" charset="0"/>
+            </a:endParaRPr>
+          </a:p>
+        </p:txBody>
+      </p:sp>
     </p:spTree>
     <p:extLst>
       <p:ext uri="{BB962C8B-B14F-4D97-AF65-F5344CB8AC3E}">

</xml_diff>